<commit_message>
Added a new scenario
</commit_message>
<xml_diff>
--- a/documentation/Adaptive Goal Management-Overview.pptx
+++ b/documentation/Adaptive Goal Management-Overview.pptx
@@ -18,7 +18,8 @@
     <p:sldId id="269" r:id="rId12"/>
     <p:sldId id="271" r:id="rId13"/>
     <p:sldId id="272" r:id="rId14"/>
-    <p:sldId id="273" r:id="rId15"/>
+    <p:sldId id="275" r:id="rId15"/>
+    <p:sldId id="273" r:id="rId16"/>
   </p:sldIdLst>
   <p:sldSz cx="12192000" cy="6858000"/>
   <p:notesSz cx="6858000" cy="9144000"/>
@@ -117,6 +118,11 @@
       </a:defRPr>
     </a:lvl9pPr>
   </p:defaultTextStyle>
+  <p:extLst>
+    <p:ext uri="{EFAFB233-063F-42B5-8137-9DF3F51BA10A}">
+      <p15:sldGuideLst xmlns:p15="http://schemas.microsoft.com/office/powerpoint/2012/main"/>
+    </p:ext>
+  </p:extLst>
 </p:presentation>
 </file>
 
@@ -269,7 +275,7 @@
           <a:p>
             <a:fld id="{F400B04A-365C-4208-83E9-D6632A4C6A45}" type="datetimeFigureOut">
               <a:rPr lang="en-US" smtClean="0"/>
-              <a:t>1/9/2021</a:t>
+              <a:t>1/17/2021</a:t>
             </a:fld>
             <a:endParaRPr lang="en-US"/>
           </a:p>
@@ -469,7 +475,7 @@
           <a:p>
             <a:fld id="{F400B04A-365C-4208-83E9-D6632A4C6A45}" type="datetimeFigureOut">
               <a:rPr lang="en-US" smtClean="0"/>
-              <a:t>1/9/2021</a:t>
+              <a:t>1/17/2021</a:t>
             </a:fld>
             <a:endParaRPr lang="en-US"/>
           </a:p>
@@ -679,7 +685,7 @@
           <a:p>
             <a:fld id="{F400B04A-365C-4208-83E9-D6632A4C6A45}" type="datetimeFigureOut">
               <a:rPr lang="en-US" smtClean="0"/>
-              <a:t>1/9/2021</a:t>
+              <a:t>1/17/2021</a:t>
             </a:fld>
             <a:endParaRPr lang="en-US"/>
           </a:p>
@@ -879,7 +885,7 @@
           <a:p>
             <a:fld id="{F400B04A-365C-4208-83E9-D6632A4C6A45}" type="datetimeFigureOut">
               <a:rPr lang="en-US" smtClean="0"/>
-              <a:t>1/9/2021</a:t>
+              <a:t>1/17/2021</a:t>
             </a:fld>
             <a:endParaRPr lang="en-US"/>
           </a:p>
@@ -1155,7 +1161,7 @@
           <a:p>
             <a:fld id="{F400B04A-365C-4208-83E9-D6632A4C6A45}" type="datetimeFigureOut">
               <a:rPr lang="en-US" smtClean="0"/>
-              <a:t>1/9/2021</a:t>
+              <a:t>1/17/2021</a:t>
             </a:fld>
             <a:endParaRPr lang="en-US"/>
           </a:p>
@@ -1423,7 +1429,7 @@
           <a:p>
             <a:fld id="{F400B04A-365C-4208-83E9-D6632A4C6A45}" type="datetimeFigureOut">
               <a:rPr lang="en-US" smtClean="0"/>
-              <a:t>1/9/2021</a:t>
+              <a:t>1/17/2021</a:t>
             </a:fld>
             <a:endParaRPr lang="en-US"/>
           </a:p>
@@ -1838,7 +1844,7 @@
           <a:p>
             <a:fld id="{F400B04A-365C-4208-83E9-D6632A4C6A45}" type="datetimeFigureOut">
               <a:rPr lang="en-US" smtClean="0"/>
-              <a:t>1/9/2021</a:t>
+              <a:t>1/17/2021</a:t>
             </a:fld>
             <a:endParaRPr lang="en-US"/>
           </a:p>
@@ -1980,7 +1986,7 @@
           <a:p>
             <a:fld id="{F400B04A-365C-4208-83E9-D6632A4C6A45}" type="datetimeFigureOut">
               <a:rPr lang="en-US" smtClean="0"/>
-              <a:t>1/9/2021</a:t>
+              <a:t>1/17/2021</a:t>
             </a:fld>
             <a:endParaRPr lang="en-US"/>
           </a:p>
@@ -2093,7 +2099,7 @@
           <a:p>
             <a:fld id="{F400B04A-365C-4208-83E9-D6632A4C6A45}" type="datetimeFigureOut">
               <a:rPr lang="en-US" smtClean="0"/>
-              <a:t>1/9/2021</a:t>
+              <a:t>1/17/2021</a:t>
             </a:fld>
             <a:endParaRPr lang="en-US"/>
           </a:p>
@@ -2406,7 +2412,7 @@
           <a:p>
             <a:fld id="{F400B04A-365C-4208-83E9-D6632A4C6A45}" type="datetimeFigureOut">
               <a:rPr lang="en-US" smtClean="0"/>
-              <a:t>1/9/2021</a:t>
+              <a:t>1/17/2021</a:t>
             </a:fld>
             <a:endParaRPr lang="en-US"/>
           </a:p>
@@ -2695,7 +2701,7 @@
           <a:p>
             <a:fld id="{F400B04A-365C-4208-83E9-D6632A4C6A45}" type="datetimeFigureOut">
               <a:rPr lang="en-US" smtClean="0"/>
-              <a:t>1/9/2021</a:t>
+              <a:t>1/17/2021</a:t>
             </a:fld>
             <a:endParaRPr lang="en-US"/>
           </a:p>
@@ -2938,7 +2944,7 @@
           <a:p>
             <a:fld id="{F400B04A-365C-4208-83E9-D6632A4C6A45}" type="datetimeFigureOut">
               <a:rPr lang="en-US" smtClean="0"/>
-              <a:t>1/9/2021</a:t>
+              <a:t>1/17/2021</a:t>
             </a:fld>
             <a:endParaRPr lang="en-US"/>
           </a:p>
@@ -9234,6 +9240,470 @@
           <p:cNvPr id="2" name="Titre 1">
             <a:extLst>
               <a:ext uri="{FF2B5EF4-FFF2-40B4-BE49-F238E27FC236}">
+                <a16:creationId xmlns:a16="http://schemas.microsoft.com/office/drawing/2014/main" id="{74327714-0BD3-4EC7-AC56-4B29F03BE8D4}"/>
+              </a:ext>
+            </a:extLst>
+          </p:cNvPr>
+          <p:cNvSpPr>
+            <a:spLocks noGrp="1"/>
+          </p:cNvSpPr>
+          <p:nvPr>
+            <p:ph type="title"/>
+          </p:nvPr>
+        </p:nvSpPr>
+        <p:spPr>
+          <a:xfrm>
+            <a:off x="925778" y="339230"/>
+            <a:ext cx="10515600" cy="1325563"/>
+          </a:xfrm>
+        </p:spPr>
+        <p:txBody>
+          <a:bodyPr/>
+          <a:lstStyle/>
+          <a:p>
+            <a:r>
+              <a:rPr lang="en-US" dirty="0"/>
+              <a:t>Example 2: Mixing multiple robots &amp; jobs</a:t>
+            </a:r>
+          </a:p>
+        </p:txBody>
+      </p:sp>
+      <p:pic>
+        <p:nvPicPr>
+          <p:cNvPr id="11" name="Image 10">
+            <a:extLst>
+              <a:ext uri="{FF2B5EF4-FFF2-40B4-BE49-F238E27FC236}">
+                <a16:creationId xmlns:a16="http://schemas.microsoft.com/office/drawing/2014/main" id="{DB4BFA94-78E3-40F9-9F6C-BE2B2D0CCC8F}"/>
+              </a:ext>
+            </a:extLst>
+          </p:cNvPr>
+          <p:cNvPicPr>
+            <a:picLocks noChangeAspect="1"/>
+          </p:cNvPicPr>
+          <p:nvPr/>
+        </p:nvPicPr>
+        <p:blipFill>
+          <a:blip r:embed="rId2"/>
+          <a:stretch>
+            <a:fillRect/>
+          </a:stretch>
+        </p:blipFill>
+        <p:spPr>
+          <a:xfrm>
+            <a:off x="1443135" y="5458968"/>
+            <a:ext cx="1049626" cy="712590"/>
+          </a:xfrm>
+          <a:prstGeom prst="rect">
+            <a:avLst/>
+          </a:prstGeom>
+        </p:spPr>
+      </p:pic>
+      <p:sp>
+        <p:nvSpPr>
+          <p:cNvPr id="17" name="ZoneTexte 16">
+            <a:extLst>
+              <a:ext uri="{FF2B5EF4-FFF2-40B4-BE49-F238E27FC236}">
+                <a16:creationId xmlns:a16="http://schemas.microsoft.com/office/drawing/2014/main" id="{641591C2-0911-454E-87A1-722A7D83F14C}"/>
+              </a:ext>
+            </a:extLst>
+          </p:cNvPr>
+          <p:cNvSpPr txBox="1"/>
+          <p:nvPr/>
+        </p:nvSpPr>
+        <p:spPr>
+          <a:xfrm>
+            <a:off x="890281" y="5067201"/>
+            <a:ext cx="2155334" cy="369332"/>
+          </a:xfrm>
+          <a:prstGeom prst="rect">
+            <a:avLst/>
+          </a:prstGeom>
+          <a:noFill/>
+        </p:spPr>
+        <p:txBody>
+          <a:bodyPr wrap="none" rtlCol="0">
+            <a:spAutoFit/>
+          </a:bodyPr>
+          <a:lstStyle/>
+          <a:p>
+            <a:r>
+              <a:rPr lang="en-US" dirty="0"/>
+              <a:t>Worker: </a:t>
+            </a:r>
+            <a:r>
+              <a:rPr lang="en-US" dirty="0" err="1"/>
+              <a:t>Hello_Robot</a:t>
+            </a:r>
+            <a:endParaRPr lang="en-US" dirty="0"/>
+          </a:p>
+        </p:txBody>
+      </p:sp>
+      <p:sp>
+        <p:nvSpPr>
+          <p:cNvPr id="22" name="ZoneTexte 21">
+            <a:extLst>
+              <a:ext uri="{FF2B5EF4-FFF2-40B4-BE49-F238E27FC236}">
+                <a16:creationId xmlns:a16="http://schemas.microsoft.com/office/drawing/2014/main" id="{E0E22223-8A27-4E66-860F-8C4E70E834BE}"/>
+              </a:ext>
+            </a:extLst>
+          </p:cNvPr>
+          <p:cNvSpPr txBox="1"/>
+          <p:nvPr/>
+        </p:nvSpPr>
+        <p:spPr>
+          <a:xfrm>
+            <a:off x="431815" y="6347533"/>
+            <a:ext cx="2900730" cy="369332"/>
+          </a:xfrm>
+          <a:prstGeom prst="rect">
+            <a:avLst/>
+          </a:prstGeom>
+          <a:noFill/>
+        </p:spPr>
+        <p:txBody>
+          <a:bodyPr wrap="none" rtlCol="0">
+            <a:spAutoFit/>
+          </a:bodyPr>
+          <a:lstStyle/>
+          <a:p>
+            <a:r>
+              <a:rPr lang="en-US" dirty="0" err="1"/>
+              <a:t>workerGroup</a:t>
+            </a:r>
+            <a:r>
+              <a:rPr lang="en-US" dirty="0"/>
+              <a:t>: PO Movement</a:t>
+            </a:r>
+          </a:p>
+        </p:txBody>
+      </p:sp>
+      <p:sp>
+        <p:nvSpPr>
+          <p:cNvPr id="23" name="Rectangle 22">
+            <a:extLst>
+              <a:ext uri="{FF2B5EF4-FFF2-40B4-BE49-F238E27FC236}">
+                <a16:creationId xmlns:a16="http://schemas.microsoft.com/office/drawing/2014/main" id="{B77AE87C-58EB-48EF-B40B-7819D828C5B0}"/>
+              </a:ext>
+            </a:extLst>
+          </p:cNvPr>
+          <p:cNvSpPr/>
+          <p:nvPr/>
+        </p:nvSpPr>
+        <p:spPr>
+          <a:xfrm>
+            <a:off x="6823212" y="3764989"/>
+            <a:ext cx="1143000" cy="1143000"/>
+          </a:xfrm>
+          <a:prstGeom prst="rect">
+            <a:avLst/>
+          </a:prstGeom>
+          <a:solidFill>
+            <a:schemeClr val="bg1"/>
+          </a:solidFill>
+          <a:ln>
+            <a:solidFill>
+              <a:schemeClr val="tx1"/>
+            </a:solidFill>
+          </a:ln>
+        </p:spPr>
+        <p:style>
+          <a:lnRef idx="2">
+            <a:schemeClr val="accent1">
+              <a:shade val="50000"/>
+            </a:schemeClr>
+          </a:lnRef>
+          <a:fillRef idx="1">
+            <a:schemeClr val="accent1"/>
+          </a:fillRef>
+          <a:effectRef idx="0">
+            <a:schemeClr val="accent1"/>
+          </a:effectRef>
+          <a:fontRef idx="minor">
+            <a:schemeClr val="lt1"/>
+          </a:fontRef>
+        </p:style>
+        <p:txBody>
+          <a:bodyPr rtlCol="0" anchor="ctr"/>
+          <a:lstStyle/>
+          <a:p>
+            <a:pPr algn="ctr"/>
+            <a:r>
+              <a:rPr lang="en-US" dirty="0">
+                <a:solidFill>
+                  <a:sysClr val="windowText" lastClr="000000"/>
+                </a:solidFill>
+              </a:rPr>
+              <a:t>Station_1</a:t>
+            </a:r>
+          </a:p>
+        </p:txBody>
+      </p:sp>
+      <p:pic>
+        <p:nvPicPr>
+          <p:cNvPr id="4" name="Image 3">
+            <a:extLst>
+              <a:ext uri="{FF2B5EF4-FFF2-40B4-BE49-F238E27FC236}">
+                <a16:creationId xmlns:a16="http://schemas.microsoft.com/office/drawing/2014/main" id="{F24C25EF-EE45-472F-8ABB-0A5ECB70E069}"/>
+              </a:ext>
+            </a:extLst>
+          </p:cNvPr>
+          <p:cNvPicPr>
+            <a:picLocks noChangeAspect="1"/>
+          </p:cNvPicPr>
+          <p:nvPr/>
+        </p:nvPicPr>
+        <p:blipFill>
+          <a:blip r:embed="rId3"/>
+          <a:stretch>
+            <a:fillRect/>
+          </a:stretch>
+        </p:blipFill>
+        <p:spPr>
+          <a:xfrm>
+            <a:off x="7035098" y="2000782"/>
+            <a:ext cx="878106" cy="1140274"/>
+          </a:xfrm>
+          <a:prstGeom prst="rect">
+            <a:avLst/>
+          </a:prstGeom>
+        </p:spPr>
+      </p:pic>
+      <p:sp>
+        <p:nvSpPr>
+          <p:cNvPr id="24" name="Rectangle 23">
+            <a:extLst>
+              <a:ext uri="{FF2B5EF4-FFF2-40B4-BE49-F238E27FC236}">
+                <a16:creationId xmlns:a16="http://schemas.microsoft.com/office/drawing/2014/main" id="{480CBD3B-4722-488F-AB4B-958D90ED553C}"/>
+              </a:ext>
+            </a:extLst>
+          </p:cNvPr>
+          <p:cNvSpPr/>
+          <p:nvPr/>
+        </p:nvSpPr>
+        <p:spPr>
+          <a:xfrm>
+            <a:off x="5241159" y="3764989"/>
+            <a:ext cx="1143000" cy="1143000"/>
+          </a:xfrm>
+          <a:prstGeom prst="rect">
+            <a:avLst/>
+          </a:prstGeom>
+          <a:solidFill>
+            <a:schemeClr val="bg1"/>
+          </a:solidFill>
+          <a:ln>
+            <a:solidFill>
+              <a:schemeClr val="tx1"/>
+            </a:solidFill>
+          </a:ln>
+        </p:spPr>
+        <p:style>
+          <a:lnRef idx="2">
+            <a:schemeClr val="accent1">
+              <a:shade val="50000"/>
+            </a:schemeClr>
+          </a:lnRef>
+          <a:fillRef idx="1">
+            <a:schemeClr val="accent1"/>
+          </a:fillRef>
+          <a:effectRef idx="0">
+            <a:schemeClr val="accent1"/>
+          </a:effectRef>
+          <a:fontRef idx="minor">
+            <a:schemeClr val="lt1"/>
+          </a:fontRef>
+        </p:style>
+        <p:txBody>
+          <a:bodyPr rtlCol="0" anchor="ctr"/>
+          <a:lstStyle/>
+          <a:p>
+            <a:pPr algn="ctr"/>
+            <a:r>
+              <a:rPr lang="en-US" dirty="0">
+                <a:solidFill>
+                  <a:sysClr val="windowText" lastClr="000000"/>
+                </a:solidFill>
+              </a:rPr>
+              <a:t>Infeed Buffer</a:t>
+            </a:r>
+          </a:p>
+        </p:txBody>
+      </p:sp>
+      <p:sp>
+        <p:nvSpPr>
+          <p:cNvPr id="25" name="Rectangle 24">
+            <a:extLst>
+              <a:ext uri="{FF2B5EF4-FFF2-40B4-BE49-F238E27FC236}">
+                <a16:creationId xmlns:a16="http://schemas.microsoft.com/office/drawing/2014/main" id="{7C0F50CC-9580-414E-AC94-68FB9038719D}"/>
+              </a:ext>
+            </a:extLst>
+          </p:cNvPr>
+          <p:cNvSpPr/>
+          <p:nvPr/>
+        </p:nvSpPr>
+        <p:spPr>
+          <a:xfrm>
+            <a:off x="8405265" y="3764989"/>
+            <a:ext cx="1143000" cy="1143000"/>
+          </a:xfrm>
+          <a:prstGeom prst="rect">
+            <a:avLst/>
+          </a:prstGeom>
+          <a:solidFill>
+            <a:schemeClr val="bg1"/>
+          </a:solidFill>
+          <a:ln>
+            <a:solidFill>
+              <a:schemeClr val="tx1"/>
+            </a:solidFill>
+          </a:ln>
+        </p:spPr>
+        <p:style>
+          <a:lnRef idx="2">
+            <a:schemeClr val="accent1">
+              <a:shade val="50000"/>
+            </a:schemeClr>
+          </a:lnRef>
+          <a:fillRef idx="1">
+            <a:schemeClr val="accent1"/>
+          </a:fillRef>
+          <a:effectRef idx="0">
+            <a:schemeClr val="accent1"/>
+          </a:effectRef>
+          <a:fontRef idx="minor">
+            <a:schemeClr val="lt1"/>
+          </a:fontRef>
+        </p:style>
+        <p:txBody>
+          <a:bodyPr rtlCol="0" anchor="ctr"/>
+          <a:lstStyle/>
+          <a:p>
+            <a:pPr algn="ctr"/>
+            <a:r>
+              <a:rPr lang="en-US" dirty="0">
+                <a:solidFill>
+                  <a:sysClr val="windowText" lastClr="000000"/>
+                </a:solidFill>
+              </a:rPr>
+              <a:t>Outfeed Buffer</a:t>
+            </a:r>
+          </a:p>
+        </p:txBody>
+      </p:sp>
+      <p:sp>
+        <p:nvSpPr>
+          <p:cNvPr id="26" name="ZoneTexte 25">
+            <a:extLst>
+              <a:ext uri="{FF2B5EF4-FFF2-40B4-BE49-F238E27FC236}">
+                <a16:creationId xmlns:a16="http://schemas.microsoft.com/office/drawing/2014/main" id="{381CA795-D689-48BE-8DF1-A6EA8D5DA1C3}"/>
+              </a:ext>
+            </a:extLst>
+          </p:cNvPr>
+          <p:cNvSpPr txBox="1"/>
+          <p:nvPr/>
+        </p:nvSpPr>
+        <p:spPr>
+          <a:xfrm>
+            <a:off x="6384159" y="1664793"/>
+            <a:ext cx="2063898" cy="369332"/>
+          </a:xfrm>
+          <a:prstGeom prst="rect">
+            <a:avLst/>
+          </a:prstGeom>
+          <a:noFill/>
+        </p:spPr>
+        <p:txBody>
+          <a:bodyPr wrap="none" rtlCol="0">
+            <a:spAutoFit/>
+          </a:bodyPr>
+          <a:lstStyle/>
+          <a:p>
+            <a:r>
+              <a:rPr lang="en-US" dirty="0"/>
+              <a:t>Worker: </a:t>
+            </a:r>
+            <a:r>
+              <a:rPr lang="en-US" dirty="0" err="1"/>
+              <a:t>Mr_Inspect</a:t>
+            </a:r>
+            <a:endParaRPr lang="en-US" dirty="0"/>
+          </a:p>
+        </p:txBody>
+      </p:sp>
+      <p:sp>
+        <p:nvSpPr>
+          <p:cNvPr id="27" name="ZoneTexte 26">
+            <a:extLst>
+              <a:ext uri="{FF2B5EF4-FFF2-40B4-BE49-F238E27FC236}">
+                <a16:creationId xmlns:a16="http://schemas.microsoft.com/office/drawing/2014/main" id="{22099479-4D3E-4EBE-BD99-2F00DE34E1BE}"/>
+              </a:ext>
+            </a:extLst>
+          </p:cNvPr>
+          <p:cNvSpPr txBox="1"/>
+          <p:nvPr/>
+        </p:nvSpPr>
+        <p:spPr>
+          <a:xfrm>
+            <a:off x="6154744" y="3148797"/>
+            <a:ext cx="2522998" cy="369332"/>
+          </a:xfrm>
+          <a:prstGeom prst="rect">
+            <a:avLst/>
+          </a:prstGeom>
+          <a:noFill/>
+        </p:spPr>
+        <p:txBody>
+          <a:bodyPr wrap="none" rtlCol="0">
+            <a:spAutoFit/>
+          </a:bodyPr>
+          <a:lstStyle/>
+          <a:p>
+            <a:r>
+              <a:rPr lang="en-US" dirty="0" err="1"/>
+              <a:t>workerGroup</a:t>
+            </a:r>
+            <a:r>
+              <a:rPr lang="en-US" dirty="0"/>
+              <a:t>: Inspection</a:t>
+            </a:r>
+          </a:p>
+        </p:txBody>
+      </p:sp>
+    </p:spTree>
+    <p:extLst>
+      <p:ext uri="{BB962C8B-B14F-4D97-AF65-F5344CB8AC3E}">
+        <p14:creationId xmlns:p14="http://schemas.microsoft.com/office/powerpoint/2010/main" val="4151437480"/>
+      </p:ext>
+    </p:extLst>
+  </p:cSld>
+  <p:clrMapOvr>
+    <a:masterClrMapping/>
+  </p:clrMapOvr>
+</p:sld>
+</file>
+
+<file path=ppt/slides/slide15.xml><?xml version="1.0" encoding="utf-8"?>
+<p:sld xmlns:a="http://schemas.openxmlformats.org/drawingml/2006/main" xmlns:r="http://schemas.openxmlformats.org/officeDocument/2006/relationships" xmlns:p="http://schemas.openxmlformats.org/presentationml/2006/main">
+  <p:cSld>
+    <p:spTree>
+      <p:nvGrpSpPr>
+        <p:cNvPr id="1" name=""/>
+        <p:cNvGrpSpPr/>
+        <p:nvPr/>
+      </p:nvGrpSpPr>
+      <p:grpSpPr>
+        <a:xfrm>
+          <a:off x="0" y="0"/>
+          <a:ext cx="0" cy="0"/>
+          <a:chOff x="0" y="0"/>
+          <a:chExt cx="0" cy="0"/>
+        </a:xfrm>
+      </p:grpSpPr>
+      <p:sp>
+        <p:nvSpPr>
+          <p:cNvPr id="2" name="Titre 1">
+            <a:extLst>
+              <a:ext uri="{FF2B5EF4-FFF2-40B4-BE49-F238E27FC236}">
                 <a16:creationId xmlns:a16="http://schemas.microsoft.com/office/drawing/2014/main" id="{324E5F78-90A8-4810-A40D-186B6F887B6E}"/>
               </a:ext>
             </a:extLst>

</xml_diff>

<commit_message>
Fixed identification of workerGroup in Example 2
</commit_message>
<xml_diff>
--- a/documentation/Adaptive Goal Management-Overview.pptx
+++ b/documentation/Adaptive Goal Management-Overview.pptx
@@ -275,7 +275,7 @@
           <a:p>
             <a:fld id="{F400B04A-365C-4208-83E9-D6632A4C6A45}" type="datetimeFigureOut">
               <a:rPr lang="en-US" smtClean="0"/>
-              <a:t>1/17/2021</a:t>
+              <a:t>1/28/2021</a:t>
             </a:fld>
             <a:endParaRPr lang="en-US"/>
           </a:p>
@@ -475,7 +475,7 @@
           <a:p>
             <a:fld id="{F400B04A-365C-4208-83E9-D6632A4C6A45}" type="datetimeFigureOut">
               <a:rPr lang="en-US" smtClean="0"/>
-              <a:t>1/17/2021</a:t>
+              <a:t>1/28/2021</a:t>
             </a:fld>
             <a:endParaRPr lang="en-US"/>
           </a:p>
@@ -685,7 +685,7 @@
           <a:p>
             <a:fld id="{F400B04A-365C-4208-83E9-D6632A4C6A45}" type="datetimeFigureOut">
               <a:rPr lang="en-US" smtClean="0"/>
-              <a:t>1/17/2021</a:t>
+              <a:t>1/28/2021</a:t>
             </a:fld>
             <a:endParaRPr lang="en-US"/>
           </a:p>
@@ -885,7 +885,7 @@
           <a:p>
             <a:fld id="{F400B04A-365C-4208-83E9-D6632A4C6A45}" type="datetimeFigureOut">
               <a:rPr lang="en-US" smtClean="0"/>
-              <a:t>1/17/2021</a:t>
+              <a:t>1/28/2021</a:t>
             </a:fld>
             <a:endParaRPr lang="en-US"/>
           </a:p>
@@ -1161,7 +1161,7 @@
           <a:p>
             <a:fld id="{F400B04A-365C-4208-83E9-D6632A4C6A45}" type="datetimeFigureOut">
               <a:rPr lang="en-US" smtClean="0"/>
-              <a:t>1/17/2021</a:t>
+              <a:t>1/28/2021</a:t>
             </a:fld>
             <a:endParaRPr lang="en-US"/>
           </a:p>
@@ -1429,7 +1429,7 @@
           <a:p>
             <a:fld id="{F400B04A-365C-4208-83E9-D6632A4C6A45}" type="datetimeFigureOut">
               <a:rPr lang="en-US" smtClean="0"/>
-              <a:t>1/17/2021</a:t>
+              <a:t>1/28/2021</a:t>
             </a:fld>
             <a:endParaRPr lang="en-US"/>
           </a:p>
@@ -1844,7 +1844,7 @@
           <a:p>
             <a:fld id="{F400B04A-365C-4208-83E9-D6632A4C6A45}" type="datetimeFigureOut">
               <a:rPr lang="en-US" smtClean="0"/>
-              <a:t>1/17/2021</a:t>
+              <a:t>1/28/2021</a:t>
             </a:fld>
             <a:endParaRPr lang="en-US"/>
           </a:p>
@@ -1986,7 +1986,7 @@
           <a:p>
             <a:fld id="{F400B04A-365C-4208-83E9-D6632A4C6A45}" type="datetimeFigureOut">
               <a:rPr lang="en-US" smtClean="0"/>
-              <a:t>1/17/2021</a:t>
+              <a:t>1/28/2021</a:t>
             </a:fld>
             <a:endParaRPr lang="en-US"/>
           </a:p>
@@ -2099,7 +2099,7 @@
           <a:p>
             <a:fld id="{F400B04A-365C-4208-83E9-D6632A4C6A45}" type="datetimeFigureOut">
               <a:rPr lang="en-US" smtClean="0"/>
-              <a:t>1/17/2021</a:t>
+              <a:t>1/28/2021</a:t>
             </a:fld>
             <a:endParaRPr lang="en-US"/>
           </a:p>
@@ -2412,7 +2412,7 @@
           <a:p>
             <a:fld id="{F400B04A-365C-4208-83E9-D6632A4C6A45}" type="datetimeFigureOut">
               <a:rPr lang="en-US" smtClean="0"/>
-              <a:t>1/17/2021</a:t>
+              <a:t>1/28/2021</a:t>
             </a:fld>
             <a:endParaRPr lang="en-US"/>
           </a:p>
@@ -2701,7 +2701,7 @@
           <a:p>
             <a:fld id="{F400B04A-365C-4208-83E9-D6632A4C6A45}" type="datetimeFigureOut">
               <a:rPr lang="en-US" smtClean="0"/>
-              <a:t>1/17/2021</a:t>
+              <a:t>1/28/2021</a:t>
             </a:fld>
             <a:endParaRPr lang="en-US"/>
           </a:p>
@@ -2944,7 +2944,7 @@
           <a:p>
             <a:fld id="{F400B04A-365C-4208-83E9-D6632A4C6A45}" type="datetimeFigureOut">
               <a:rPr lang="en-US" smtClean="0"/>
-              <a:t>1/17/2021</a:t>
+              <a:t>1/28/2021</a:t>
             </a:fld>
             <a:endParaRPr lang="en-US"/>
           </a:p>
@@ -9313,7 +9313,7 @@
         <p:spPr>
           <a:xfrm>
             <a:off x="890281" y="5067201"/>
-            <a:ext cx="2155334" cy="369332"/>
+            <a:ext cx="2206566" cy="369332"/>
           </a:xfrm>
           <a:prstGeom prst="rect">
             <a:avLst/>
@@ -9332,7 +9332,7 @@
             </a:r>
             <a:r>
               <a:rPr lang="en-US" dirty="0" err="1"/>
-              <a:t>Hello_Robot</a:t>
+              <a:t>Robo_Mover</a:t>
             </a:r>
             <a:endParaRPr lang="en-US" dirty="0"/>
           </a:p>
@@ -9391,7 +9391,7 @@
         </p:nvSpPr>
         <p:spPr>
           <a:xfrm>
-            <a:off x="6823212" y="3764989"/>
+            <a:off x="3006586" y="3513930"/>
             <a:ext cx="1143000" cy="1143000"/>
           </a:xfrm>
           <a:prstGeom prst="rect">
@@ -9433,7 +9433,7 @@
                   <a:sysClr val="windowText" lastClr="000000"/>
                 </a:solidFill>
               </a:rPr>
-              <a:t>Station_1</a:t>
+              <a:t>Assembly</a:t>
             </a:r>
           </a:p>
         </p:txBody>
@@ -9460,7 +9460,7 @@
         </p:blipFill>
         <p:spPr>
           <a:xfrm>
-            <a:off x="7035098" y="2000782"/>
+            <a:off x="3271480" y="1800448"/>
             <a:ext cx="878106" cy="1140274"/>
           </a:xfrm>
           <a:prstGeom prst="rect">
@@ -9482,7 +9482,7 @@
         </p:nvSpPr>
         <p:spPr>
           <a:xfrm>
-            <a:off x="5241159" y="3764989"/>
+            <a:off x="738981" y="3513930"/>
             <a:ext cx="1143000" cy="1143000"/>
           </a:xfrm>
           <a:prstGeom prst="rect">
@@ -9543,7 +9543,7 @@
         </p:nvSpPr>
         <p:spPr>
           <a:xfrm>
-            <a:off x="8405265" y="3764989"/>
+            <a:off x="8613914" y="3513930"/>
             <a:ext cx="1143000" cy="1143000"/>
           </a:xfrm>
           <a:prstGeom prst="rect">
@@ -9604,8 +9604,8 @@
         </p:nvSpPr>
         <p:spPr>
           <a:xfrm>
-            <a:off x="6384159" y="1664793"/>
-            <a:ext cx="2063898" cy="369332"/>
+            <a:off x="2620541" y="1464459"/>
+            <a:ext cx="2570512" cy="369332"/>
           </a:xfrm>
           <a:prstGeom prst="rect">
             <a:avLst/>
@@ -9624,7 +9624,7 @@
             </a:r>
             <a:r>
               <a:rPr lang="en-US" dirty="0" err="1"/>
-              <a:t>Mr_Inspect</a:t>
+              <a:t>Robot_Assemble</a:t>
             </a:r>
             <a:endParaRPr lang="en-US" dirty="0"/>
           </a:p>
@@ -9644,7 +9644,177 @@
         </p:nvSpPr>
         <p:spPr>
           <a:xfrm>
-            <a:off x="6154744" y="3148797"/>
+            <a:off x="2391126" y="2948463"/>
+            <a:ext cx="2436436" cy="369332"/>
+          </a:xfrm>
+          <a:prstGeom prst="rect">
+            <a:avLst/>
+          </a:prstGeom>
+          <a:noFill/>
+        </p:spPr>
+        <p:txBody>
+          <a:bodyPr wrap="none" rtlCol="0">
+            <a:spAutoFit/>
+          </a:bodyPr>
+          <a:lstStyle/>
+          <a:p>
+            <a:r>
+              <a:rPr lang="en-US" dirty="0" err="1"/>
+              <a:t>workerGroup</a:t>
+            </a:r>
+            <a:r>
+              <a:rPr lang="en-US" dirty="0"/>
+              <a:t>: Assembly</a:t>
+            </a:r>
+          </a:p>
+        </p:txBody>
+      </p:sp>
+      <p:sp>
+        <p:nvSpPr>
+          <p:cNvPr id="15" name="Rectangle 14">
+            <a:extLst>
+              <a:ext uri="{FF2B5EF4-FFF2-40B4-BE49-F238E27FC236}">
+                <a16:creationId xmlns:a16="http://schemas.microsoft.com/office/drawing/2014/main" id="{94BB4648-7A93-4C83-80AF-45D46919ABBE}"/>
+              </a:ext>
+            </a:extLst>
+          </p:cNvPr>
+          <p:cNvSpPr/>
+          <p:nvPr/>
+        </p:nvSpPr>
+        <p:spPr>
+          <a:xfrm>
+            <a:off x="5877339" y="3513930"/>
+            <a:ext cx="1364974" cy="1143000"/>
+          </a:xfrm>
+          <a:prstGeom prst="rect">
+            <a:avLst/>
+          </a:prstGeom>
+          <a:solidFill>
+            <a:schemeClr val="bg1"/>
+          </a:solidFill>
+          <a:ln>
+            <a:solidFill>
+              <a:schemeClr val="tx1"/>
+            </a:solidFill>
+          </a:ln>
+        </p:spPr>
+        <p:style>
+          <a:lnRef idx="2">
+            <a:schemeClr val="accent1">
+              <a:shade val="50000"/>
+            </a:schemeClr>
+          </a:lnRef>
+          <a:fillRef idx="1">
+            <a:schemeClr val="accent1"/>
+          </a:fillRef>
+          <a:effectRef idx="0">
+            <a:schemeClr val="accent1"/>
+          </a:effectRef>
+          <a:fontRef idx="minor">
+            <a:schemeClr val="lt1"/>
+          </a:fontRef>
+        </p:style>
+        <p:txBody>
+          <a:bodyPr rtlCol="0" anchor="ctr"/>
+          <a:lstStyle/>
+          <a:p>
+            <a:pPr algn="ctr"/>
+            <a:r>
+              <a:rPr lang="en-US" dirty="0">
+                <a:solidFill>
+                  <a:sysClr val="windowText" lastClr="000000"/>
+                </a:solidFill>
+              </a:rPr>
+              <a:t>Inspection</a:t>
+            </a:r>
+          </a:p>
+        </p:txBody>
+      </p:sp>
+      <p:pic>
+        <p:nvPicPr>
+          <p:cNvPr id="16" name="Image 15">
+            <a:extLst>
+              <a:ext uri="{FF2B5EF4-FFF2-40B4-BE49-F238E27FC236}">
+                <a16:creationId xmlns:a16="http://schemas.microsoft.com/office/drawing/2014/main" id="{A0EFB614-62F8-49D3-BD21-760132A06ED0}"/>
+              </a:ext>
+            </a:extLst>
+          </p:cNvPr>
+          <p:cNvPicPr>
+            <a:picLocks noChangeAspect="1"/>
+          </p:cNvPicPr>
+          <p:nvPr/>
+        </p:nvPicPr>
+        <p:blipFill>
+          <a:blip r:embed="rId3"/>
+          <a:stretch>
+            <a:fillRect/>
+          </a:stretch>
+        </p:blipFill>
+        <p:spPr>
+          <a:xfrm>
+            <a:off x="6360894" y="1800448"/>
+            <a:ext cx="878106" cy="1140274"/>
+          </a:xfrm>
+          <a:prstGeom prst="rect">
+            <a:avLst/>
+          </a:prstGeom>
+        </p:spPr>
+      </p:pic>
+      <p:sp>
+        <p:nvSpPr>
+          <p:cNvPr id="18" name="ZoneTexte 17">
+            <a:extLst>
+              <a:ext uri="{FF2B5EF4-FFF2-40B4-BE49-F238E27FC236}">
+                <a16:creationId xmlns:a16="http://schemas.microsoft.com/office/drawing/2014/main" id="{9F798BB1-ED37-46BC-BEA6-7F04E8E89000}"/>
+              </a:ext>
+            </a:extLst>
+          </p:cNvPr>
+          <p:cNvSpPr txBox="1"/>
+          <p:nvPr/>
+        </p:nvSpPr>
+        <p:spPr>
+          <a:xfrm>
+            <a:off x="5709955" y="1464459"/>
+            <a:ext cx="2272353" cy="369332"/>
+          </a:xfrm>
+          <a:prstGeom prst="rect">
+            <a:avLst/>
+          </a:prstGeom>
+          <a:noFill/>
+        </p:spPr>
+        <p:txBody>
+          <a:bodyPr wrap="none" rtlCol="0">
+            <a:spAutoFit/>
+          </a:bodyPr>
+          <a:lstStyle/>
+          <a:p>
+            <a:r>
+              <a:rPr lang="en-US" dirty="0"/>
+              <a:t>Worker: </a:t>
+            </a:r>
+            <a:r>
+              <a:rPr lang="en-US" dirty="0" err="1"/>
+              <a:t>Robo_Inspect</a:t>
+            </a:r>
+            <a:endParaRPr lang="en-US" dirty="0"/>
+          </a:p>
+        </p:txBody>
+      </p:sp>
+      <p:sp>
+        <p:nvSpPr>
+          <p:cNvPr id="19" name="ZoneTexte 18">
+            <a:extLst>
+              <a:ext uri="{FF2B5EF4-FFF2-40B4-BE49-F238E27FC236}">
+                <a16:creationId xmlns:a16="http://schemas.microsoft.com/office/drawing/2014/main" id="{BC32C7DE-601C-437B-A653-EAC94E405F3F}"/>
+              </a:ext>
+            </a:extLst>
+          </p:cNvPr>
+          <p:cNvSpPr txBox="1"/>
+          <p:nvPr/>
+        </p:nvSpPr>
+        <p:spPr>
+          <a:xfrm>
+            <a:off x="5480540" y="2948463"/>
             <a:ext cx="2522998" cy="369332"/>
           </a:xfrm>
           <a:prstGeom prst="rect">

</xml_diff>